<commit_message>
adding preparing labs ppt
</commit_message>
<xml_diff>
--- a/labs/preparing_labs.pptx
+++ b/labs/preparing_labs.pptx
@@ -5,7 +5,7 @@
     <p:sldMasterId id="2147483648" r:id="rId1"/>
   </p:sldMasterIdLst>
   <p:notesMasterIdLst>
-    <p:notesMasterId r:id="rId8"/>
+    <p:notesMasterId r:id="rId9"/>
   </p:notesMasterIdLst>
   <p:sldIdLst>
     <p:sldId id="338" r:id="rId2"/>
@@ -13,7 +13,8 @@
     <p:sldId id="450" r:id="rId4"/>
     <p:sldId id="435" r:id="rId5"/>
     <p:sldId id="442" r:id="rId6"/>
-    <p:sldId id="429" r:id="rId7"/>
+    <p:sldId id="451" r:id="rId7"/>
+    <p:sldId id="429" r:id="rId8"/>
   </p:sldIdLst>
   <p:sldSz cx="9144000" cy="5143500" type="screen16x9"/>
   <p:notesSz cx="6858000" cy="9144000"/>
@@ -8708,7 +8709,7 @@
                 </a:solidFill>
                 <a:uFillTx/>
               </a:rPr>
-              <a:t>Distribute data automatically</a:t>
+              <a:t>(…)</a:t>
             </a:r>
           </a:p>
           <a:p>
@@ -8730,7 +8731,7 @@
                 </a:solidFill>
                 <a:uFillTx/>
               </a:rPr>
-              <a:t>HA / Fail-over</a:t>
+              <a:t>(…)</a:t>
             </a:r>
           </a:p>
           <a:p>
@@ -9051,7 +9052,7 @@
                 </a:solidFill>
                 <a:uFillTx/>
               </a:rPr>
-              <a:t>Scale-out</a:t>
+              <a:t>(…)</a:t>
             </a:r>
             <a:endParaRPr lang="en-US" sz="1500" dirty="0" smtClean="0">
               <a:solidFill>
@@ -9381,13 +9382,13 @@
               </a:defRPr>
             </a:pPr>
             <a:r>
-              <a:rPr lang="en-US" sz="1500" dirty="0" smtClean="0">
+              <a:rPr lang="en-US" sz="1500" dirty="0">
                 <a:solidFill>
                   <a:schemeClr val="tx1"/>
                 </a:solidFill>
                 <a:uFillTx/>
               </a:rPr>
-              <a:t>Scale-out</a:t>
+              <a:t>Easily connect to external tools</a:t>
             </a:r>
           </a:p>
           <a:p>
@@ -9409,7 +9410,7 @@
                 </a:solidFill>
                 <a:uFillTx/>
               </a:rPr>
-              <a:t>Built-in processors</a:t>
+              <a:t>Scale-out</a:t>
             </a:r>
           </a:p>
           <a:p>
@@ -9431,14 +9432,8 @@
                 </a:solidFill>
                 <a:uFillTx/>
               </a:rPr>
-              <a:t>Easily connect to external tools</a:t>
-            </a:r>
-            <a:endParaRPr lang="en-US" sz="1500" dirty="0" smtClean="0">
-              <a:solidFill>
-                <a:schemeClr val="tx1"/>
-              </a:solidFill>
-              <a:uFillTx/>
-            </a:endParaRPr>
+              <a:t>Built-in processors</a:t>
+            </a:r>
           </a:p>
           <a:p>
             <a:pPr defTabSz="694944">
@@ -10557,7 +10552,7 @@
               </a:defRPr>
             </a:pPr>
             <a:r>
-              <a:rPr lang="x-none" sz="2000" dirty="0" smtClean="0">
+              <a:rPr lang="x-none" sz="2200" dirty="0" smtClean="0">
                 <a:solidFill>
                   <a:schemeClr val="accent1">
                     <a:lumMod val="75000"/>
@@ -10566,7 +10561,7 @@
               </a:rPr>
               <a:t>Once you have access to an environment….</a:t>
             </a:r>
-            <a:endParaRPr sz="2000" dirty="0">
+            <a:endParaRPr sz="2200" dirty="0">
               <a:solidFill>
                 <a:schemeClr val="accent1">
                   <a:lumMod val="75000"/>
@@ -10678,6 +10673,955 @@
 </file>
 
 <file path=ppt/slides/slide6.xml><?xml version="1.0" encoding="utf-8"?>
+<p:sld xmlns:a="http://schemas.openxmlformats.org/drawingml/2006/main" xmlns:r="http://schemas.openxmlformats.org/officeDocument/2006/relationships" xmlns:p="http://schemas.openxmlformats.org/presentationml/2006/main">
+  <p:cSld>
+    <p:spTree>
+      <p:nvGrpSpPr>
+        <p:cNvPr id="1" name=""/>
+        <p:cNvGrpSpPr/>
+        <p:nvPr/>
+      </p:nvGrpSpPr>
+      <p:grpSpPr>
+        <a:xfrm>
+          <a:off x="0" y="0"/>
+          <a:ext cx="0" cy="0"/>
+          <a:chOff x="0" y="0"/>
+          <a:chExt cx="0" cy="0"/>
+        </a:xfrm>
+      </p:grpSpPr>
+      <p:sp>
+        <p:nvSpPr>
+          <p:cNvPr id="3" name="Shape 605"/>
+          <p:cNvSpPr>
+            <a:spLocks noGrp="1"/>
+          </p:cNvSpPr>
+          <p:nvPr>
+            <p:ph type="title"/>
+          </p:nvPr>
+        </p:nvSpPr>
+        <p:spPr>
+          <a:xfrm>
+            <a:off x="386251" y="216018"/>
+            <a:ext cx="8410576" cy="623888"/>
+          </a:xfrm>
+          <a:prstGeom prst="rect">
+            <a:avLst/>
+          </a:prstGeom>
+        </p:spPr>
+        <p:txBody>
+          <a:bodyPr/>
+          <a:lstStyle>
+            <a:lvl1pPr>
+              <a:defRPr>
+                <a:solidFill>
+                  <a:srgbClr val="0F786E"/>
+                </a:solidFill>
+              </a:defRPr>
+            </a:lvl1pPr>
+          </a:lstStyle>
+          <a:p>
+            <a:pPr lvl="0">
+              <a:defRPr sz="1800">
+                <a:solidFill>
+                  <a:srgbClr val="000000"/>
+                </a:solidFill>
+                <a:uFillTx/>
+              </a:defRPr>
+            </a:pPr>
+            <a:r>
+              <a:rPr sz="2800" dirty="0">
+                <a:solidFill>
+                  <a:srgbClr val="0F786E"/>
+                </a:solidFill>
+                <a:uFill>
+                  <a:solidFill>
+                    <a:srgbClr val="008881"/>
+                  </a:solidFill>
+                </a:uFill>
+              </a:rPr>
+              <a:t>Coming Up</a:t>
+            </a:r>
+          </a:p>
+        </p:txBody>
+      </p:sp>
+      <p:sp>
+        <p:nvSpPr>
+          <p:cNvPr id="4" name="Shape 606"/>
+          <p:cNvSpPr txBox="1">
+            <a:spLocks/>
+          </p:cNvSpPr>
+          <p:nvPr/>
+        </p:nvSpPr>
+        <p:spPr>
+          <a:xfrm>
+            <a:off x="347176" y="785565"/>
+            <a:ext cx="8410576" cy="3892129"/>
+          </a:xfrm>
+          <a:prstGeom prst="rect">
+            <a:avLst/>
+          </a:prstGeom>
+        </p:spPr>
+        <p:txBody>
+          <a:bodyPr>
+            <a:normAutofit/>
+          </a:bodyPr>
+          <a:lstStyle>
+            <a:lvl1pPr marL="228600" indent="-228600">
+              <a:spcBef>
+                <a:spcPts val="1200"/>
+              </a:spcBef>
+              <a:buClr>
+                <a:srgbClr val="33928A"/>
+              </a:buClr>
+              <a:buSzPct val="100000"/>
+              <a:buFont typeface="Wingdings"/>
+              <a:buChar char="•"/>
+              <a:defRPr sz="2400">
+                <a:solidFill>
+                  <a:srgbClr val="4D4D4D"/>
+                </a:solidFill>
+                <a:uFill>
+                  <a:solidFill>
+                    <a:srgbClr val="4D4D4D"/>
+                  </a:solidFill>
+                </a:uFill>
+                <a:latin typeface="Arial"/>
+                <a:ea typeface="Arial"/>
+                <a:cs typeface="Arial"/>
+                <a:sym typeface="Arial"/>
+              </a:defRPr>
+            </a:lvl1pPr>
+            <a:lvl2pPr marL="800100" indent="-342900">
+              <a:spcBef>
+                <a:spcPts val="1200"/>
+              </a:spcBef>
+              <a:buClr>
+                <a:srgbClr val="33928A"/>
+              </a:buClr>
+              <a:buSzPct val="100000"/>
+              <a:buFont typeface="Wingdings"/>
+              <a:buChar char="–"/>
+              <a:defRPr sz="2400">
+                <a:solidFill>
+                  <a:srgbClr val="4D4D4D"/>
+                </a:solidFill>
+                <a:uFill>
+                  <a:solidFill>
+                    <a:srgbClr val="4D4D4D"/>
+                  </a:solidFill>
+                </a:uFill>
+                <a:latin typeface="Arial"/>
+                <a:ea typeface="Arial"/>
+                <a:cs typeface="Arial"/>
+                <a:sym typeface="Arial"/>
+              </a:defRPr>
+            </a:lvl2pPr>
+            <a:lvl3pPr marL="1257300" indent="-342900">
+              <a:spcBef>
+                <a:spcPts val="1200"/>
+              </a:spcBef>
+              <a:buClr>
+                <a:srgbClr val="33928A"/>
+              </a:buClr>
+              <a:buSzPct val="100000"/>
+              <a:buFont typeface="Wingdings"/>
+              <a:buChar char="▪"/>
+              <a:defRPr sz="2400">
+                <a:solidFill>
+                  <a:srgbClr val="4D4D4D"/>
+                </a:solidFill>
+                <a:uFill>
+                  <a:solidFill>
+                    <a:srgbClr val="4D4D4D"/>
+                  </a:solidFill>
+                </a:uFill>
+                <a:latin typeface="Arial"/>
+                <a:ea typeface="Arial"/>
+                <a:cs typeface="Arial"/>
+                <a:sym typeface="Arial"/>
+              </a:defRPr>
+            </a:lvl3pPr>
+            <a:lvl4pPr marL="1946276" indent="-574676">
+              <a:spcBef>
+                <a:spcPts val="1200"/>
+              </a:spcBef>
+              <a:buClr>
+                <a:srgbClr val="33928A"/>
+              </a:buClr>
+              <a:buSzPct val="100000"/>
+              <a:buFont typeface="Wingdings"/>
+              <a:buChar char="—"/>
+              <a:defRPr sz="2400">
+                <a:solidFill>
+                  <a:srgbClr val="4D4D4D"/>
+                </a:solidFill>
+                <a:uFill>
+                  <a:solidFill>
+                    <a:srgbClr val="4D4D4D"/>
+                  </a:solidFill>
+                </a:uFill>
+                <a:latin typeface="Arial"/>
+                <a:ea typeface="Arial"/>
+                <a:cs typeface="Arial"/>
+                <a:sym typeface="Arial"/>
+              </a:defRPr>
+            </a:lvl4pPr>
+            <a:lvl5pPr marL="2327563" indent="-498763">
+              <a:spcBef>
+                <a:spcPts val="1200"/>
+              </a:spcBef>
+              <a:buClr>
+                <a:srgbClr val="33928A"/>
+              </a:buClr>
+              <a:buSzPct val="100000"/>
+              <a:buFont typeface="Wingdings"/>
+              <a:buChar char="»"/>
+              <a:defRPr sz="2400">
+                <a:solidFill>
+                  <a:srgbClr val="4D4D4D"/>
+                </a:solidFill>
+                <a:uFill>
+                  <a:solidFill>
+                    <a:srgbClr val="4D4D4D"/>
+                  </a:solidFill>
+                </a:uFill>
+                <a:latin typeface="Arial"/>
+                <a:ea typeface="Arial"/>
+                <a:cs typeface="Arial"/>
+                <a:sym typeface="Arial"/>
+              </a:defRPr>
+            </a:lvl5pPr>
+            <a:lvl6pPr marL="2560320" indent="-274320">
+              <a:spcBef>
+                <a:spcPts val="1200"/>
+              </a:spcBef>
+              <a:buClr>
+                <a:srgbClr val="33928A"/>
+              </a:buClr>
+              <a:buSzPct val="100000"/>
+              <a:buFont typeface="Wingdings"/>
+              <a:buChar char="•"/>
+              <a:defRPr sz="2400">
+                <a:solidFill>
+                  <a:srgbClr val="4D4D4D"/>
+                </a:solidFill>
+                <a:uFill>
+                  <a:solidFill>
+                    <a:srgbClr val="4D4D4D"/>
+                  </a:solidFill>
+                </a:uFill>
+                <a:latin typeface="Arial"/>
+                <a:ea typeface="Arial"/>
+                <a:cs typeface="Arial"/>
+                <a:sym typeface="Arial"/>
+              </a:defRPr>
+            </a:lvl6pPr>
+            <a:lvl7pPr marL="3017520" indent="-274320">
+              <a:spcBef>
+                <a:spcPts val="1200"/>
+              </a:spcBef>
+              <a:buClr>
+                <a:srgbClr val="33928A"/>
+              </a:buClr>
+              <a:buSzPct val="100000"/>
+              <a:buFont typeface="Wingdings"/>
+              <a:buChar char="•"/>
+              <a:defRPr sz="2400">
+                <a:solidFill>
+                  <a:srgbClr val="4D4D4D"/>
+                </a:solidFill>
+                <a:uFill>
+                  <a:solidFill>
+                    <a:srgbClr val="4D4D4D"/>
+                  </a:solidFill>
+                </a:uFill>
+                <a:latin typeface="Arial"/>
+                <a:ea typeface="Arial"/>
+                <a:cs typeface="Arial"/>
+                <a:sym typeface="Arial"/>
+              </a:defRPr>
+            </a:lvl7pPr>
+            <a:lvl8pPr marL="3474720" indent="-274320">
+              <a:spcBef>
+                <a:spcPts val="1200"/>
+              </a:spcBef>
+              <a:buClr>
+                <a:srgbClr val="33928A"/>
+              </a:buClr>
+              <a:buSzPct val="100000"/>
+              <a:buFont typeface="Wingdings"/>
+              <a:buChar char="•"/>
+              <a:defRPr sz="2400">
+                <a:solidFill>
+                  <a:srgbClr val="4D4D4D"/>
+                </a:solidFill>
+                <a:uFill>
+                  <a:solidFill>
+                    <a:srgbClr val="4D4D4D"/>
+                  </a:solidFill>
+                </a:uFill>
+                <a:latin typeface="Arial"/>
+                <a:ea typeface="Arial"/>
+                <a:cs typeface="Arial"/>
+                <a:sym typeface="Arial"/>
+              </a:defRPr>
+            </a:lvl8pPr>
+            <a:lvl9pPr marL="3931920" indent="-274320">
+              <a:spcBef>
+                <a:spcPts val="1200"/>
+              </a:spcBef>
+              <a:buClr>
+                <a:srgbClr val="33928A"/>
+              </a:buClr>
+              <a:buSzPct val="100000"/>
+              <a:buFont typeface="Wingdings"/>
+              <a:buChar char="•"/>
+              <a:defRPr sz="2400">
+                <a:solidFill>
+                  <a:srgbClr val="4D4D4D"/>
+                </a:solidFill>
+                <a:uFill>
+                  <a:solidFill>
+                    <a:srgbClr val="4D4D4D"/>
+                  </a:solidFill>
+                </a:uFill>
+                <a:latin typeface="Arial"/>
+                <a:ea typeface="Arial"/>
+                <a:cs typeface="Arial"/>
+                <a:sym typeface="Arial"/>
+              </a:defRPr>
+            </a:lvl9pPr>
+          </a:lstStyle>
+          <a:p>
+            <a:pPr marL="118871" indent="-118871" defTabSz="475487">
+              <a:lnSpc>
+                <a:spcPct val="120000"/>
+              </a:lnSpc>
+              <a:spcBef>
+                <a:spcPts val="600"/>
+              </a:spcBef>
+              <a:defRPr sz="1800">
+                <a:solidFill>
+                  <a:srgbClr val="000000"/>
+                </a:solidFill>
+                <a:uFillTx/>
+              </a:defRPr>
+            </a:pPr>
+            <a:r>
+              <a:rPr lang="en-US" sz="1600" dirty="0" smtClean="0">
+                <a:solidFill>
+                  <a:srgbClr val="5E5E5E"/>
+                </a:solidFill>
+                <a:latin typeface="Avenir Next Demi Bold"/>
+                <a:ea typeface="Avenir Next Demi Bold"/>
+                <a:cs typeface="Avenir Next Demi Bold"/>
+                <a:sym typeface="Avenir Next Demi Bold"/>
+              </a:rPr>
+              <a:t> Break (60</a:t>
+            </a:r>
+            <a:r>
+              <a:rPr lang="en-US" sz="1600" dirty="0" smtClean="0">
+                <a:solidFill>
+                  <a:srgbClr val="5E5E5E"/>
+                </a:solidFill>
+                <a:latin typeface="Avenir Next Demi Bold"/>
+                <a:ea typeface="Avenir Next Demi Bold"/>
+                <a:cs typeface="Avenir Next Demi Bold"/>
+                <a:sym typeface="Avenir Next Demi Bold"/>
+              </a:rPr>
+              <a:t>’</a:t>
+            </a:r>
+            <a:r>
+              <a:rPr lang="en-US" sz="1600" dirty="0" smtClean="0">
+                <a:solidFill>
+                  <a:srgbClr val="5E5E5E"/>
+                </a:solidFill>
+                <a:latin typeface="Avenir Next Demi Bold"/>
+                <a:ea typeface="Avenir Next Demi Bold"/>
+                <a:cs typeface="Avenir Next Demi Bold"/>
+                <a:sym typeface="Avenir Next Demi Bold"/>
+              </a:rPr>
+              <a:t>) – Lunch!!</a:t>
+            </a:r>
+          </a:p>
+          <a:p>
+            <a:pPr marL="118871" indent="-118871" defTabSz="475487">
+              <a:lnSpc>
+                <a:spcPct val="120000"/>
+              </a:lnSpc>
+              <a:spcBef>
+                <a:spcPts val="600"/>
+              </a:spcBef>
+              <a:defRPr sz="1800">
+                <a:solidFill>
+                  <a:srgbClr val="000000"/>
+                </a:solidFill>
+                <a:uFillTx/>
+              </a:defRPr>
+            </a:pPr>
+            <a:r>
+              <a:rPr lang="en-US" sz="1600" dirty="0" smtClean="0">
+                <a:solidFill>
+                  <a:srgbClr val="5E5E5E"/>
+                </a:solidFill>
+                <a:latin typeface="Avenir Next Demi Bold"/>
+                <a:ea typeface="Avenir Next Demi Bold"/>
+                <a:cs typeface="Avenir Next Demi Bold"/>
+                <a:sym typeface="Avenir Next Demi Bold"/>
+              </a:rPr>
+              <a:t> </a:t>
+            </a:r>
+            <a:r>
+              <a:rPr lang="en-US" sz="1600" dirty="0" err="1" smtClean="0">
+                <a:solidFill>
+                  <a:srgbClr val="5E5E5E"/>
+                </a:solidFill>
+                <a:latin typeface="Avenir Next Demi Bold"/>
+                <a:ea typeface="Avenir Next Demi Bold"/>
+                <a:cs typeface="Avenir Next Demi Bold"/>
+                <a:sym typeface="Avenir Next Demi Bold"/>
+              </a:rPr>
+              <a:t>GemFire</a:t>
+            </a:r>
+            <a:r>
+              <a:rPr lang="en-US" sz="1600" dirty="0" smtClean="0">
+                <a:solidFill>
+                  <a:srgbClr val="5E5E5E"/>
+                </a:solidFill>
+                <a:latin typeface="Avenir Next Demi Bold"/>
+                <a:ea typeface="Avenir Next Demi Bold"/>
+                <a:cs typeface="Avenir Next Demi Bold"/>
+                <a:sym typeface="Avenir Next Demi Bold"/>
+              </a:rPr>
+              <a:t> </a:t>
+            </a:r>
+            <a:r>
+              <a:rPr lang="en-US" sz="1600" dirty="0">
+                <a:solidFill>
+                  <a:srgbClr val="5E5E5E"/>
+                </a:solidFill>
+                <a:latin typeface="Avenir Next Demi Bold"/>
+                <a:ea typeface="Avenir Next Demi Bold"/>
+                <a:cs typeface="Avenir Next Demi Bold"/>
+                <a:sym typeface="Avenir Next Demi Bold"/>
+              </a:rPr>
+              <a:t>Lab </a:t>
+            </a:r>
+            <a:r>
+              <a:rPr lang="en-US" sz="1600" dirty="0" smtClean="0">
+                <a:solidFill>
+                  <a:srgbClr val="5E5E5E"/>
+                </a:solidFill>
+                <a:latin typeface="Avenir Next Demi Bold"/>
+                <a:ea typeface="Avenir Next Demi Bold"/>
+                <a:cs typeface="Avenir Next Demi Bold"/>
+                <a:sym typeface="Avenir Next Demi Bold"/>
+              </a:rPr>
+              <a:t>(40</a:t>
+            </a:r>
+            <a:r>
+              <a:rPr lang="en-US" sz="1600" dirty="0" smtClean="0">
+                <a:solidFill>
+                  <a:srgbClr val="5E5E5E"/>
+                </a:solidFill>
+                <a:latin typeface="Avenir Next Demi Bold"/>
+                <a:ea typeface="Avenir Next Demi Bold"/>
+                <a:cs typeface="Avenir Next Demi Bold"/>
+                <a:sym typeface="Avenir Next Demi Bold"/>
+              </a:rPr>
+              <a:t>'</a:t>
+            </a:r>
+            <a:r>
+              <a:rPr lang="en-US" sz="1600" dirty="0" smtClean="0">
+                <a:solidFill>
+                  <a:srgbClr val="5E5E5E"/>
+                </a:solidFill>
+                <a:latin typeface="Avenir Next Demi Bold"/>
+                <a:ea typeface="Avenir Next Demi Bold"/>
+                <a:cs typeface="Avenir Next Demi Bold"/>
+                <a:sym typeface="Avenir Next Demi Bold"/>
+              </a:rPr>
+              <a:t>)</a:t>
+            </a:r>
+            <a:endParaRPr lang="en-US" sz="1600" dirty="0">
+              <a:solidFill>
+                <a:srgbClr val="5E5E5E"/>
+              </a:solidFill>
+              <a:latin typeface="Avenir Next Demi Bold"/>
+              <a:ea typeface="Avenir Next Demi Bold"/>
+              <a:cs typeface="Avenir Next Demi Bold"/>
+              <a:sym typeface="Avenir Next Demi Bold"/>
+            </a:endParaRPr>
+          </a:p>
+          <a:p>
+            <a:pPr marL="356615" lvl="1" indent="-118871" defTabSz="475487">
+              <a:lnSpc>
+                <a:spcPct val="120000"/>
+              </a:lnSpc>
+              <a:spcBef>
+                <a:spcPts val="600"/>
+              </a:spcBef>
+              <a:buFont typeface="Wingdings"/>
+              <a:buChar char="•"/>
+              <a:defRPr sz="1800">
+                <a:solidFill>
+                  <a:srgbClr val="000000"/>
+                </a:solidFill>
+                <a:uFillTx/>
+              </a:defRPr>
+            </a:pPr>
+            <a:r>
+              <a:rPr lang="en-US" sz="1600" dirty="0" smtClean="0">
+                <a:solidFill>
+                  <a:srgbClr val="5E5E5E"/>
+                </a:solidFill>
+              </a:rPr>
+              <a:t> </a:t>
+            </a:r>
+            <a:r>
+              <a:rPr lang="en-US" sz="1600" dirty="0">
+                <a:solidFill>
+                  <a:srgbClr val="5E5E5E"/>
+                </a:solidFill>
+              </a:rPr>
+              <a:t> First steps with Pivotal </a:t>
+            </a:r>
+            <a:r>
+              <a:rPr lang="en-US" sz="1600" dirty="0" err="1" smtClean="0">
+                <a:solidFill>
+                  <a:srgbClr val="5E5E5E"/>
+                </a:solidFill>
+              </a:rPr>
+              <a:t>GemFire</a:t>
+            </a:r>
+            <a:endParaRPr lang="en-US" sz="1600" dirty="0">
+              <a:solidFill>
+                <a:srgbClr val="5E5E5E"/>
+              </a:solidFill>
+            </a:endParaRPr>
+          </a:p>
+          <a:p>
+            <a:pPr marL="356615" lvl="1" indent="-118871" defTabSz="475487">
+              <a:lnSpc>
+                <a:spcPct val="120000"/>
+              </a:lnSpc>
+              <a:spcBef>
+                <a:spcPts val="600"/>
+              </a:spcBef>
+              <a:buFont typeface="Wingdings"/>
+              <a:buChar char="•"/>
+              <a:defRPr sz="1800">
+                <a:solidFill>
+                  <a:srgbClr val="000000"/>
+                </a:solidFill>
+                <a:uFillTx/>
+              </a:defRPr>
+            </a:pPr>
+            <a:r>
+              <a:rPr lang="en-US" sz="1600" dirty="0" smtClean="0">
+                <a:solidFill>
+                  <a:srgbClr val="5E5E5E"/>
+                </a:solidFill>
+              </a:rPr>
+              <a:t> Learn (…)</a:t>
+            </a:r>
+            <a:endParaRPr lang="en-US" sz="1600" dirty="0">
+              <a:solidFill>
+                <a:srgbClr val="5E5E5E"/>
+              </a:solidFill>
+            </a:endParaRPr>
+          </a:p>
+          <a:p>
+            <a:pPr marL="118871" indent="-118871" defTabSz="475487">
+              <a:lnSpc>
+                <a:spcPct val="120000"/>
+              </a:lnSpc>
+              <a:spcBef>
+                <a:spcPts val="600"/>
+              </a:spcBef>
+              <a:defRPr sz="1800">
+                <a:solidFill>
+                  <a:srgbClr val="000000"/>
+                </a:solidFill>
+                <a:uFillTx/>
+              </a:defRPr>
+            </a:pPr>
+            <a:r>
+              <a:rPr lang="en-US" sz="1600" dirty="0" smtClean="0">
+                <a:solidFill>
+                  <a:srgbClr val="5E5E5E"/>
+                </a:solidFill>
+                <a:latin typeface="Avenir Next Demi Bold"/>
+                <a:ea typeface="Avenir Next Demi Bold"/>
+                <a:cs typeface="Avenir Next Demi Bold"/>
+                <a:sym typeface="Avenir Next Demi Bold"/>
+              </a:rPr>
+              <a:t> Pivotal HD + </a:t>
+            </a:r>
+            <a:r>
+              <a:rPr lang="en-US" sz="1600" dirty="0" err="1" smtClean="0">
+                <a:solidFill>
+                  <a:srgbClr val="5E5E5E"/>
+                </a:solidFill>
+                <a:latin typeface="Avenir Next Demi Bold"/>
+                <a:ea typeface="Avenir Next Demi Bold"/>
+                <a:cs typeface="Avenir Next Demi Bold"/>
+                <a:sym typeface="Avenir Next Demi Bold"/>
+              </a:rPr>
+              <a:t>Hawq</a:t>
+            </a:r>
+            <a:r>
+              <a:rPr lang="en-US" sz="1600" dirty="0" smtClean="0">
+                <a:solidFill>
+                  <a:srgbClr val="5E5E5E"/>
+                </a:solidFill>
+                <a:latin typeface="Avenir Next Demi Bold"/>
+                <a:ea typeface="Avenir Next Demi Bold"/>
+                <a:cs typeface="Avenir Next Demi Bold"/>
+                <a:sym typeface="Avenir Next Demi Bold"/>
+              </a:rPr>
+              <a:t> Lab (40</a:t>
+            </a:r>
+            <a:r>
+              <a:rPr lang="en-US" sz="1600" dirty="0" smtClean="0">
+                <a:solidFill>
+                  <a:srgbClr val="5E5E5E"/>
+                </a:solidFill>
+                <a:latin typeface="Avenir Next Demi Bold"/>
+                <a:ea typeface="Avenir Next Demi Bold"/>
+                <a:cs typeface="Avenir Next Demi Bold"/>
+                <a:sym typeface="Avenir Next Demi Bold"/>
+              </a:rPr>
+              <a:t>'</a:t>
+            </a:r>
+            <a:r>
+              <a:rPr lang="en-US" sz="1600" dirty="0" smtClean="0">
+                <a:solidFill>
+                  <a:srgbClr val="5E5E5E"/>
+                </a:solidFill>
+                <a:latin typeface="Avenir Next Demi Bold"/>
+                <a:ea typeface="Avenir Next Demi Bold"/>
+                <a:cs typeface="Avenir Next Demi Bold"/>
+                <a:sym typeface="Avenir Next Demi Bold"/>
+              </a:rPr>
+              <a:t>)</a:t>
+            </a:r>
+            <a:endParaRPr lang="en-US" sz="1600" dirty="0">
+              <a:solidFill>
+                <a:srgbClr val="5E5E5E"/>
+              </a:solidFill>
+              <a:latin typeface="Avenir Next Demi Bold"/>
+              <a:ea typeface="Avenir Next Demi Bold"/>
+              <a:cs typeface="Avenir Next Demi Bold"/>
+              <a:sym typeface="Avenir Next Demi Bold"/>
+            </a:endParaRPr>
+          </a:p>
+          <a:p>
+            <a:pPr marL="356615" lvl="1" indent="-118871" defTabSz="475487">
+              <a:lnSpc>
+                <a:spcPct val="120000"/>
+              </a:lnSpc>
+              <a:spcBef>
+                <a:spcPts val="600"/>
+              </a:spcBef>
+              <a:buFont typeface="Wingdings"/>
+              <a:buChar char="•"/>
+              <a:defRPr sz="1800">
+                <a:solidFill>
+                  <a:srgbClr val="000000"/>
+                </a:solidFill>
+                <a:uFillTx/>
+              </a:defRPr>
+            </a:pPr>
+            <a:r>
+              <a:rPr lang="en-US" sz="1600" dirty="0" smtClean="0">
+                <a:solidFill>
+                  <a:srgbClr val="5E5E5E"/>
+                </a:solidFill>
+              </a:rPr>
+              <a:t> First steps with Pivotal HD and </a:t>
+            </a:r>
+            <a:r>
+              <a:rPr lang="en-US" sz="1600" dirty="0" err="1" smtClean="0">
+                <a:solidFill>
+                  <a:srgbClr val="5E5E5E"/>
+                </a:solidFill>
+              </a:rPr>
+              <a:t>Hawq</a:t>
+            </a:r>
+            <a:endParaRPr lang="en-US" sz="1600" dirty="0">
+              <a:solidFill>
+                <a:srgbClr val="5E5E5E"/>
+              </a:solidFill>
+            </a:endParaRPr>
+          </a:p>
+          <a:p>
+            <a:pPr marL="356615" lvl="1" indent="-118871" defTabSz="475487">
+              <a:lnSpc>
+                <a:spcPct val="120000"/>
+              </a:lnSpc>
+              <a:spcBef>
+                <a:spcPts val="600"/>
+              </a:spcBef>
+              <a:buFont typeface="Wingdings"/>
+              <a:buChar char="•"/>
+              <a:defRPr sz="1800">
+                <a:solidFill>
+                  <a:srgbClr val="000000"/>
+                </a:solidFill>
+                <a:uFillTx/>
+              </a:defRPr>
+            </a:pPr>
+            <a:r>
+              <a:rPr lang="en-US" sz="1600" dirty="0" smtClean="0">
+                <a:solidFill>
+                  <a:srgbClr val="5E5E5E"/>
+                </a:solidFill>
+              </a:rPr>
+              <a:t> Learn (…)</a:t>
+            </a:r>
+            <a:endParaRPr lang="en-US" sz="1600" dirty="0">
+              <a:solidFill>
+                <a:srgbClr val="5E5E5E"/>
+              </a:solidFill>
+            </a:endParaRPr>
+          </a:p>
+          <a:p>
+            <a:pPr marL="118871" indent="-118871" defTabSz="475487">
+              <a:lnSpc>
+                <a:spcPct val="120000"/>
+              </a:lnSpc>
+              <a:spcBef>
+                <a:spcPts val="600"/>
+              </a:spcBef>
+              <a:defRPr sz="1800">
+                <a:solidFill>
+                  <a:srgbClr val="000000"/>
+                </a:solidFill>
+                <a:uFillTx/>
+              </a:defRPr>
+            </a:pPr>
+            <a:r>
+              <a:rPr lang="en-US" sz="1600" dirty="0" smtClean="0">
+                <a:solidFill>
+                  <a:srgbClr val="5E5E5E"/>
+                </a:solidFill>
+                <a:latin typeface="Avenir Next Demi Bold"/>
+                <a:ea typeface="Avenir Next Demi Bold"/>
+                <a:cs typeface="Avenir Next Demi Bold"/>
+                <a:sym typeface="Avenir Next Demi Bold"/>
+              </a:rPr>
+              <a:t> Data Streaming with Spring XD Lab (+ </a:t>
+            </a:r>
+            <a:r>
+              <a:rPr lang="en-US" sz="1600" dirty="0" err="1" smtClean="0">
+                <a:solidFill>
+                  <a:srgbClr val="5E5E5E"/>
+                </a:solidFill>
+                <a:latin typeface="Avenir Next Demi Bold"/>
+                <a:ea typeface="Avenir Next Demi Bold"/>
+                <a:cs typeface="Avenir Next Demi Bold"/>
+                <a:sym typeface="Avenir Next Demi Bold"/>
+              </a:rPr>
+              <a:t>GemFire</a:t>
+            </a:r>
+            <a:r>
+              <a:rPr lang="en-US" sz="1600" dirty="0" smtClean="0">
+                <a:solidFill>
+                  <a:srgbClr val="5E5E5E"/>
+                </a:solidFill>
+                <a:latin typeface="Avenir Next Demi Bold"/>
+                <a:ea typeface="Avenir Next Demi Bold"/>
+                <a:cs typeface="Avenir Next Demi Bold"/>
+                <a:sym typeface="Avenir Next Demi Bold"/>
+              </a:rPr>
+              <a:t> and Pivotal HD / </a:t>
+            </a:r>
+            <a:r>
+              <a:rPr lang="en-US" sz="1600" dirty="0" err="1" smtClean="0">
+                <a:solidFill>
+                  <a:srgbClr val="5E5E5E"/>
+                </a:solidFill>
+                <a:latin typeface="Avenir Next Demi Bold"/>
+                <a:ea typeface="Avenir Next Demi Bold"/>
+                <a:cs typeface="Avenir Next Demi Bold"/>
+                <a:sym typeface="Avenir Next Demi Bold"/>
+              </a:rPr>
+              <a:t>Hawq</a:t>
+            </a:r>
+            <a:r>
+              <a:rPr lang="en-US" sz="1600" dirty="0" smtClean="0">
+                <a:solidFill>
+                  <a:srgbClr val="5E5E5E"/>
+                </a:solidFill>
+                <a:latin typeface="Avenir Next Demi Bold"/>
+                <a:ea typeface="Avenir Next Demi Bold"/>
+                <a:cs typeface="Avenir Next Demi Bold"/>
+                <a:sym typeface="Avenir Next Demi Bold"/>
+              </a:rPr>
+              <a:t>) – 40</a:t>
+            </a:r>
+            <a:r>
+              <a:rPr lang="en-US" sz="1600" dirty="0">
+                <a:solidFill>
+                  <a:srgbClr val="5E5E5E"/>
+                </a:solidFill>
+                <a:latin typeface="Avenir Next Demi Bold"/>
+                <a:ea typeface="Avenir Next Demi Bold"/>
+                <a:cs typeface="Avenir Next Demi Bold"/>
+                <a:sym typeface="Avenir Next Demi Bold"/>
+              </a:rPr>
+              <a:t>'</a:t>
+            </a:r>
+            <a:endParaRPr lang="en-US" sz="1600" dirty="0" smtClean="0">
+              <a:solidFill>
+                <a:srgbClr val="5E5E5E"/>
+              </a:solidFill>
+              <a:latin typeface="Avenir Next Demi Bold"/>
+              <a:ea typeface="Avenir Next Demi Bold"/>
+              <a:cs typeface="Avenir Next Demi Bold"/>
+              <a:sym typeface="Avenir Next Demi Bold"/>
+            </a:endParaRPr>
+          </a:p>
+          <a:p>
+            <a:pPr marL="356615" lvl="1" indent="-118871" defTabSz="475487">
+              <a:lnSpc>
+                <a:spcPct val="120000"/>
+              </a:lnSpc>
+              <a:spcBef>
+                <a:spcPts val="600"/>
+              </a:spcBef>
+              <a:buFont typeface="Wingdings"/>
+              <a:buChar char="•"/>
+              <a:defRPr sz="1800">
+                <a:solidFill>
+                  <a:srgbClr val="000000"/>
+                </a:solidFill>
+                <a:uFillTx/>
+              </a:defRPr>
+            </a:pPr>
+            <a:r>
+              <a:rPr lang="en-US" sz="1600" dirty="0" smtClean="0">
+                <a:solidFill>
+                  <a:srgbClr val="5E5E5E"/>
+                </a:solidFill>
+              </a:rPr>
+              <a:t> First steps with Spring XD</a:t>
+            </a:r>
+          </a:p>
+          <a:p>
+            <a:pPr marL="356615" lvl="1" indent="-118871" defTabSz="475487">
+              <a:lnSpc>
+                <a:spcPct val="120000"/>
+              </a:lnSpc>
+              <a:spcBef>
+                <a:spcPts val="600"/>
+              </a:spcBef>
+              <a:buFont typeface="Wingdings"/>
+              <a:buChar char="•"/>
+              <a:defRPr sz="1800">
+                <a:solidFill>
+                  <a:srgbClr val="000000"/>
+                </a:solidFill>
+                <a:uFillTx/>
+              </a:defRPr>
+            </a:pPr>
+            <a:r>
+              <a:rPr lang="en-US" sz="1600" dirty="0">
+                <a:solidFill>
+                  <a:srgbClr val="5E5E5E"/>
+                </a:solidFill>
+              </a:rPr>
+              <a:t> </a:t>
+            </a:r>
+            <a:r>
+              <a:rPr lang="en-US" sz="1600" dirty="0" smtClean="0">
+                <a:solidFill>
+                  <a:srgbClr val="5E5E5E"/>
+                </a:solidFill>
+              </a:rPr>
+              <a:t>Learn how to build a Data Stream Pipeline using Spring XD</a:t>
+            </a:r>
+          </a:p>
+        </p:txBody>
+      </p:sp>
+      <p:sp>
+        <p:nvSpPr>
+          <p:cNvPr id="5" name="Shape 607"/>
+          <p:cNvSpPr>
+            <a:spLocks noGrp="1"/>
+          </p:cNvSpPr>
+          <p:nvPr>
+            <p:ph type="sldNum" sz="quarter" idx="2"/>
+          </p:nvPr>
+        </p:nvSpPr>
+        <p:spPr>
+          <a:xfrm>
+            <a:off x="8553450" y="5021495"/>
+            <a:ext cx="533400" cy="127001"/>
+          </a:xfrm>
+          <a:prstGeom prst="rect">
+            <a:avLst/>
+          </a:prstGeom>
+          <a:extLst>
+            <a:ext uri="{C572A759-6A51-4108-AA02-DFA0A04FC94B}">
+              <ma14:wrappingTextBoxFlag xmlns:ma14="http://schemas.microsoft.com/office/mac/drawingml/2011/main" val="1"/>
+            </a:ext>
+          </a:extLst>
+        </p:spPr>
+        <p:txBody>
+          <a:bodyPr/>
+          <a:lstStyle/>
+          <a:p>
+            <a:pPr lvl="0">
+              <a:defRPr sz="1800">
+                <a:solidFill>
+                  <a:srgbClr val="000000"/>
+                </a:solidFill>
+                <a:uFillTx/>
+              </a:defRPr>
+            </a:pPr>
+            <a:fld id="{86CB4B4D-7CA3-9044-876B-883B54F8677D}" type="slidenum">
+              <a:rPr sz="800">
+                <a:solidFill>
+                  <a:srgbClr val="808080"/>
+                </a:solidFill>
+                <a:uFill>
+                  <a:solidFill>
+                    <a:srgbClr val="808080"/>
+                  </a:solidFill>
+                </a:uFill>
+              </a:rPr>
+              <a:t>6</a:t>
+            </a:fld>
+            <a:endParaRPr sz="800">
+              <a:solidFill>
+                <a:srgbClr val="808080"/>
+              </a:solidFill>
+              <a:uFill>
+                <a:solidFill>
+                  <a:srgbClr val="808080"/>
+                </a:solidFill>
+              </a:uFill>
+            </a:endParaRPr>
+          </a:p>
+        </p:txBody>
+      </p:sp>
+    </p:spTree>
+    <p:extLst>
+      <p:ext uri="{BB962C8B-B14F-4D97-AF65-F5344CB8AC3E}">
+        <p14:creationId xmlns:p14="http://schemas.microsoft.com/office/powerpoint/2010/main" val="3643737885"/>
+      </p:ext>
+    </p:extLst>
+  </p:cSld>
+  <p:clrMapOvr>
+    <a:masterClrMapping/>
+  </p:clrMapOvr>
+  <p:transition xmlns:p14="http://schemas.microsoft.com/office/powerpoint/2010/main" spd="med"/>
+</p:sld>
+</file>
+
+<file path=ppt/slides/slide7.xml><?xml version="1.0" encoding="utf-8"?>
 <p:sld xmlns:a="http://schemas.openxmlformats.org/drawingml/2006/main" xmlns:r="http://schemas.openxmlformats.org/officeDocument/2006/relationships" xmlns:p="http://schemas.openxmlformats.org/presentationml/2006/main">
   <p:cSld>
     <p:spTree>

</xml_diff>

<commit_message>
updating preparing labs ppt
</commit_message>
<xml_diff>
--- a/labs/preparing_labs.pptx
+++ b/labs/preparing_labs.pptx
@@ -10503,8 +10503,8 @@
         </p:blipFill>
         <p:spPr>
           <a:xfrm>
-            <a:off x="693617" y="639873"/>
-            <a:ext cx="7789914" cy="3977982"/>
+            <a:off x="732693" y="649642"/>
+            <a:ext cx="7502768" cy="3831349"/>
           </a:xfrm>
           <a:prstGeom prst="rect">
             <a:avLst/>

</xml_diff>